<commit_message>
docs: add use case diagram
</commit_message>
<xml_diff>
--- a/doc/第二阶段课堂展示/第二阶段课堂展示.pptx
+++ b/doc/第二阶段课堂展示/第二阶段课堂展示.pptx
@@ -5,17 +5,18 @@
     <p:sldMasterId id="2147483648" r:id="rId1"/>
   </p:sldMasterIdLst>
   <p:notesMasterIdLst>
-    <p:notesMasterId r:id="rId10"/>
+    <p:notesMasterId r:id="rId11"/>
   </p:notesMasterIdLst>
   <p:sldIdLst>
     <p:sldId id="256" r:id="rId2"/>
     <p:sldId id="257" r:id="rId3"/>
     <p:sldId id="259" r:id="rId4"/>
     <p:sldId id="282" r:id="rId5"/>
-    <p:sldId id="283" r:id="rId6"/>
-    <p:sldId id="284" r:id="rId7"/>
-    <p:sldId id="285" r:id="rId8"/>
-    <p:sldId id="260" r:id="rId9"/>
+    <p:sldId id="286" r:id="rId6"/>
+    <p:sldId id="283" r:id="rId7"/>
+    <p:sldId id="284" r:id="rId8"/>
+    <p:sldId id="285" r:id="rId9"/>
+    <p:sldId id="260" r:id="rId10"/>
   </p:sldIdLst>
   <p:sldSz cx="9144000" cy="5143500" type="screen16x9"/>
   <p:notesSz cx="6858000" cy="9144000"/>
@@ -6215,6 +6216,100 @@
       </p:grpSpPr>
       <p:sp>
         <p:nvSpPr>
+          <p:cNvPr id="2" name="标题 1">
+            <a:extLst>
+              <a:ext uri="{FF2B5EF4-FFF2-40B4-BE49-F238E27FC236}">
+                <a16:creationId xmlns:a16="http://schemas.microsoft.com/office/drawing/2014/main" id="{54869CAB-FF17-419D-BC24-DFC8660280C2}"/>
+              </a:ext>
+            </a:extLst>
+          </p:cNvPr>
+          <p:cNvSpPr>
+            <a:spLocks noGrp="1"/>
+          </p:cNvSpPr>
+          <p:nvPr>
+            <p:ph type="title"/>
+          </p:nvPr>
+        </p:nvSpPr>
+        <p:spPr/>
+        <p:txBody>
+          <a:bodyPr/>
+          <a:lstStyle/>
+          <a:p>
+            <a:r>
+              <a:rPr lang="zh-CN" altLang="en-US" dirty="0"/>
+              <a:t>用况图</a:t>
+            </a:r>
+            <a:endParaRPr lang="en-US" dirty="0"/>
+          </a:p>
+        </p:txBody>
+      </p:sp>
+      <p:pic>
+        <p:nvPicPr>
+          <p:cNvPr id="5" name="内容占位符 4">
+            <a:extLst>
+              <a:ext uri="{FF2B5EF4-FFF2-40B4-BE49-F238E27FC236}">
+                <a16:creationId xmlns:a16="http://schemas.microsoft.com/office/drawing/2014/main" id="{556D92F4-45D0-488E-B063-F3428913BED0}"/>
+              </a:ext>
+            </a:extLst>
+          </p:cNvPr>
+          <p:cNvPicPr>
+            <a:picLocks noGrp="1" noChangeAspect="1"/>
+          </p:cNvPicPr>
+          <p:nvPr>
+            <p:ph idx="1"/>
+          </p:nvPr>
+        </p:nvPicPr>
+        <p:blipFill>
+          <a:blip r:embed="rId2" cstate="print">
+            <a:extLst>
+              <a:ext uri="{28A0092B-C50C-407E-A947-70E740481C1C}">
+                <a14:useLocalDpi xmlns:a14="http://schemas.microsoft.com/office/drawing/2010/main" val="0"/>
+              </a:ext>
+            </a:extLst>
+          </a:blip>
+          <a:stretch>
+            <a:fillRect/>
+          </a:stretch>
+        </p:blipFill>
+        <p:spPr>
+          <a:xfrm>
+            <a:off x="3655770" y="1147308"/>
+            <a:ext cx="4078122" cy="3690267"/>
+          </a:xfrm>
+        </p:spPr>
+      </p:pic>
+    </p:spTree>
+    <p:extLst>
+      <p:ext uri="{BB962C8B-B14F-4D97-AF65-F5344CB8AC3E}">
+        <p14:creationId xmlns:p14="http://schemas.microsoft.com/office/powerpoint/2010/main" val="2451724335"/>
+      </p:ext>
+    </p:extLst>
+  </p:cSld>
+  <p:clrMapOvr>
+    <a:masterClrMapping/>
+  </p:clrMapOvr>
+</p:sld>
+</file>
+
+<file path=ppt/slides/slide6.xml><?xml version="1.0" encoding="utf-8"?>
+<p:sld xmlns:a="http://schemas.openxmlformats.org/drawingml/2006/main" xmlns:r="http://schemas.openxmlformats.org/officeDocument/2006/relationships" xmlns:p="http://schemas.openxmlformats.org/presentationml/2006/main">
+  <p:cSld>
+    <p:spTree>
+      <p:nvGrpSpPr>
+        <p:cNvPr id="1" name=""/>
+        <p:cNvGrpSpPr/>
+        <p:nvPr/>
+      </p:nvGrpSpPr>
+      <p:grpSpPr>
+        <a:xfrm>
+          <a:off x="0" y="0"/>
+          <a:ext cx="0" cy="0"/>
+          <a:chOff x="0" y="0"/>
+          <a:chExt cx="0" cy="0"/>
+        </a:xfrm>
+      </p:grpSpPr>
+      <p:sp>
+        <p:nvSpPr>
           <p:cNvPr id="2" name="Title 1"/>
           <p:cNvSpPr>
             <a:spLocks noGrp="1"/>
@@ -6351,7 +6446,7 @@
 </p:sld>
 </file>
 
-<file path=ppt/slides/slide6.xml><?xml version="1.0" encoding="utf-8"?>
+<file path=ppt/slides/slide7.xml><?xml version="1.0" encoding="utf-8"?>
 <p:sld xmlns:a="http://schemas.openxmlformats.org/drawingml/2006/main" xmlns:r="http://schemas.openxmlformats.org/officeDocument/2006/relationships" xmlns:p="http://schemas.openxmlformats.org/presentationml/2006/main">
   <p:cSld>
     <p:spTree>
@@ -6511,7 +6606,7 @@
 </p:sld>
 </file>
 
-<file path=ppt/slides/slide7.xml><?xml version="1.0" encoding="utf-8"?>
+<file path=ppt/slides/slide8.xml><?xml version="1.0" encoding="utf-8"?>
 <p:sld xmlns:a="http://schemas.openxmlformats.org/drawingml/2006/main" xmlns:r="http://schemas.openxmlformats.org/officeDocument/2006/relationships" xmlns:p="http://schemas.openxmlformats.org/presentationml/2006/main">
   <p:cSld>
     <p:spTree>
@@ -6605,7 +6700,7 @@
 </p:sld>
 </file>
 
-<file path=ppt/slides/slide8.xml><?xml version="1.0" encoding="utf-8"?>
+<file path=ppt/slides/slide9.xml><?xml version="1.0" encoding="utf-8"?>
 <p:sld xmlns:a="http://schemas.openxmlformats.org/drawingml/2006/main" xmlns:r="http://schemas.openxmlformats.org/officeDocument/2006/relationships" xmlns:p="http://schemas.openxmlformats.org/presentationml/2006/main">
   <p:cSld>
     <p:spTree>

</xml_diff>